<commit_message>
push.sh at 2019年05月20日 1:31:10
</commit_message>
<xml_diff>
--- a/chap/img/crnn.pptx
+++ b/chap/img/crnn.pptx
@@ -104,6 +104,11 @@
       </a:defRPr>
     </a:lvl9pPr>
   </p:defaultTextStyle>
+  <p:extLst>
+    <p:ext uri="{EFAFB233-063F-42B5-8137-9DF3F51BA10A}">
+      <p15:sldGuideLst xmlns:p15="http://schemas.microsoft.com/office/powerpoint/2012/main"/>
+    </p:ext>
+  </p:extLst>
 </p:presentation>
 </file>
 
@@ -238,7 +243,7 @@
           <a:p>
             <a:fld id="{18EEF904-054F-43A7-8D7C-FCBAD52CCB0B}" type="datetimeFigureOut">
               <a:rPr lang="en-US" smtClean="0"/>
-              <a:t>4/28/2019</a:t>
+              <a:t>5/20/2019</a:t>
             </a:fld>
             <a:endParaRPr lang="en-US"/>
           </a:p>
@@ -408,7 +413,7 @@
           <a:p>
             <a:fld id="{18EEF904-054F-43A7-8D7C-FCBAD52CCB0B}" type="datetimeFigureOut">
               <a:rPr lang="en-US" smtClean="0"/>
-              <a:t>4/28/2019</a:t>
+              <a:t>5/20/2019</a:t>
             </a:fld>
             <a:endParaRPr lang="en-US"/>
           </a:p>
@@ -588,7 +593,7 @@
           <a:p>
             <a:fld id="{18EEF904-054F-43A7-8D7C-FCBAD52CCB0B}" type="datetimeFigureOut">
               <a:rPr lang="en-US" smtClean="0"/>
-              <a:t>4/28/2019</a:t>
+              <a:t>5/20/2019</a:t>
             </a:fld>
             <a:endParaRPr lang="en-US"/>
           </a:p>
@@ -758,7 +763,7 @@
           <a:p>
             <a:fld id="{18EEF904-054F-43A7-8D7C-FCBAD52CCB0B}" type="datetimeFigureOut">
               <a:rPr lang="en-US" smtClean="0"/>
-              <a:t>4/28/2019</a:t>
+              <a:t>5/20/2019</a:t>
             </a:fld>
             <a:endParaRPr lang="en-US"/>
           </a:p>
@@ -1004,7 +1009,7 @@
           <a:p>
             <a:fld id="{18EEF904-054F-43A7-8D7C-FCBAD52CCB0B}" type="datetimeFigureOut">
               <a:rPr lang="en-US" smtClean="0"/>
-              <a:t>4/28/2019</a:t>
+              <a:t>5/20/2019</a:t>
             </a:fld>
             <a:endParaRPr lang="en-US"/>
           </a:p>
@@ -1236,7 +1241,7 @@
           <a:p>
             <a:fld id="{18EEF904-054F-43A7-8D7C-FCBAD52CCB0B}" type="datetimeFigureOut">
               <a:rPr lang="en-US" smtClean="0"/>
-              <a:t>4/28/2019</a:t>
+              <a:t>5/20/2019</a:t>
             </a:fld>
             <a:endParaRPr lang="en-US"/>
           </a:p>
@@ -1603,7 +1608,7 @@
           <a:p>
             <a:fld id="{18EEF904-054F-43A7-8D7C-FCBAD52CCB0B}" type="datetimeFigureOut">
               <a:rPr lang="en-US" smtClean="0"/>
-              <a:t>4/28/2019</a:t>
+              <a:t>5/20/2019</a:t>
             </a:fld>
             <a:endParaRPr lang="en-US"/>
           </a:p>
@@ -1721,7 +1726,7 @@
           <a:p>
             <a:fld id="{18EEF904-054F-43A7-8D7C-FCBAD52CCB0B}" type="datetimeFigureOut">
               <a:rPr lang="en-US" smtClean="0"/>
-              <a:t>4/28/2019</a:t>
+              <a:t>5/20/2019</a:t>
             </a:fld>
             <a:endParaRPr lang="en-US"/>
           </a:p>
@@ -1816,7 +1821,7 @@
           <a:p>
             <a:fld id="{18EEF904-054F-43A7-8D7C-FCBAD52CCB0B}" type="datetimeFigureOut">
               <a:rPr lang="en-US" smtClean="0"/>
-              <a:t>4/28/2019</a:t>
+              <a:t>5/20/2019</a:t>
             </a:fld>
             <a:endParaRPr lang="en-US"/>
           </a:p>
@@ -2093,7 +2098,7 @@
           <a:p>
             <a:fld id="{18EEF904-054F-43A7-8D7C-FCBAD52CCB0B}" type="datetimeFigureOut">
               <a:rPr lang="en-US" smtClean="0"/>
-              <a:t>4/28/2019</a:t>
+              <a:t>5/20/2019</a:t>
             </a:fld>
             <a:endParaRPr lang="en-US"/>
           </a:p>
@@ -2346,7 +2351,7 @@
           <a:p>
             <a:fld id="{18EEF904-054F-43A7-8D7C-FCBAD52CCB0B}" type="datetimeFigureOut">
               <a:rPr lang="en-US" smtClean="0"/>
-              <a:t>4/28/2019</a:t>
+              <a:t>5/20/2019</a:t>
             </a:fld>
             <a:endParaRPr lang="en-US"/>
           </a:p>
@@ -2559,7 +2564,7 @@
           <a:p>
             <a:fld id="{18EEF904-054F-43A7-8D7C-FCBAD52CCB0B}" type="datetimeFigureOut">
               <a:rPr lang="en-US" smtClean="0"/>
-              <a:t>4/28/2019</a:t>
+              <a:t>5/20/2019</a:t>
             </a:fld>
             <a:endParaRPr lang="en-US"/>
           </a:p>
@@ -3429,21 +3434,30 @@
             <a:pPr algn="ctr"/>
             <a:r>
               <a:rPr lang="en-US" dirty="0" smtClean="0"/>
-              <a:t>RNN</a:t>
-            </a:r>
+              <a:t>LSTM</a:t>
+            </a:r>
+            <a:endParaRPr lang="en-US" dirty="0" smtClean="0"/>
           </a:p>
           <a:p>
             <a:pPr algn="ctr"/>
             <a:r>
               <a:rPr lang="en-US" dirty="0" smtClean="0"/>
-              <a:t>(RNN,LSTM,GRU,…)</a:t>
+              <a:t>(</a:t>
+            </a:r>
+            <a:r>
+              <a:rPr lang="en-US" dirty="0" smtClean="0"/>
+              <a:t>RNN,GRU</a:t>
+            </a:r>
+            <a:r>
+              <a:rPr lang="en-US" dirty="0" smtClean="0"/>
+              <a:t>,…)</a:t>
             </a:r>
             <a:endParaRPr lang="en-US" dirty="0"/>
           </a:p>
         </p:txBody>
       </p:sp>
-      <mc:AlternateContent xmlns:mc="http://schemas.openxmlformats.org/markup-compatibility/2006">
-        <mc:Choice xmlns:a14="http://schemas.microsoft.com/office/drawing/2010/main" Requires="a14">
+      <mc:AlternateContent xmlns:mc="http://schemas.openxmlformats.org/markup-compatibility/2006" xmlns:a14="http://schemas.microsoft.com/office/drawing/2010/main">
+        <mc:Choice Requires="a14">
           <p:sp>
             <p:nvSpPr>
               <p:cNvPr id="27" name="矩形 26"/>
@@ -3465,6 +3479,7 @@
               </a:bodyPr>
               <a:lstStyle/>
               <a:p>
+                <a:pPr/>
                 <a14:m>
                   <m:oMathPara xmlns:m="http://schemas.openxmlformats.org/officeDocument/2006/math">
                     <m:oMathParaPr>
@@ -3510,7 +3525,7 @@
             </p:txBody>
           </p:sp>
         </mc:Choice>
-        <mc:Fallback>
+        <mc:Fallback xmlns="">
           <p:sp>
             <p:nvSpPr>
               <p:cNvPr id="27" name="矩形 26"/>
@@ -3549,8 +3564,8 @@
           </p:sp>
         </mc:Fallback>
       </mc:AlternateContent>
-      <mc:AlternateContent xmlns:mc="http://schemas.openxmlformats.org/markup-compatibility/2006">
-        <mc:Choice xmlns:a14="http://schemas.microsoft.com/office/drawing/2010/main" Requires="a14">
+      <mc:AlternateContent xmlns:mc="http://schemas.openxmlformats.org/markup-compatibility/2006" xmlns:a14="http://schemas.microsoft.com/office/drawing/2010/main">
+        <mc:Choice Requires="a14">
           <p:sp>
             <p:nvSpPr>
               <p:cNvPr id="28" name="矩形 27"/>
@@ -3572,6 +3587,7 @@
               </a:bodyPr>
               <a:lstStyle/>
               <a:p>
+                <a:pPr/>
                 <a14:m>
                   <m:oMathPara xmlns:m="http://schemas.openxmlformats.org/officeDocument/2006/math">
                     <m:oMathParaPr>
@@ -3611,7 +3627,7 @@
             </p:txBody>
           </p:sp>
         </mc:Choice>
-        <mc:Fallback>
+        <mc:Fallback xmlns="">
           <p:sp>
             <p:nvSpPr>
               <p:cNvPr id="28" name="矩形 27"/>
@@ -3673,12 +3689,20 @@
           <a:lstStyle/>
           <a:p>
             <a:r>
-              <a:rPr lang="en-US" dirty="0" smtClean="0"/>
-              <a:t>Block-CRNN</a:t>
+              <a:rPr lang="en-US" dirty="0" err="1"/>
+              <a:t>Conv</a:t>
+            </a:r>
+            <a:r>
+              <a:rPr lang="en-US" dirty="0"/>
+              <a:t>-LSTM</a:t>
             </a:r>
             <a:r>
               <a:rPr lang="zh-CN" altLang="en-US" dirty="0" smtClean="0"/>
-              <a:t>的输出</a:t>
+              <a:t>的</a:t>
+            </a:r>
+            <a:r>
+              <a:rPr lang="zh-CN" altLang="en-US" dirty="0" smtClean="0"/>
+              <a:t>输出</a:t>
             </a:r>
             <a:endParaRPr lang="en-US" dirty="0"/>
           </a:p>
@@ -3693,7 +3717,7 @@
         <p:spPr>
           <a:xfrm>
             <a:off x="1112124" y="877649"/>
-            <a:ext cx="1996059" cy="369332"/>
+            <a:ext cx="1926489" cy="369332"/>
           </a:xfrm>
           <a:prstGeom prst="rect">
             <a:avLst/>
@@ -3707,12 +3731,20 @@
           <a:lstStyle/>
           <a:p>
             <a:r>
+              <a:rPr lang="en-US" dirty="0" err="1" smtClean="0"/>
+              <a:t>Conv</a:t>
+            </a:r>
+            <a:r>
               <a:rPr lang="en-US" dirty="0" smtClean="0"/>
-              <a:t>Block-CRNN</a:t>
+              <a:t>-LSTM</a:t>
             </a:r>
             <a:r>
               <a:rPr lang="zh-CN" altLang="en-US" dirty="0" smtClean="0"/>
-              <a:t>的输入</a:t>
+              <a:t>的</a:t>
+            </a:r>
+            <a:r>
+              <a:rPr lang="zh-CN" altLang="en-US" dirty="0" smtClean="0"/>
+              <a:t>输入</a:t>
             </a:r>
             <a:endParaRPr lang="en-US" dirty="0"/>
           </a:p>

</xml_diff>